<commit_message>
Update Presentation Final Edition.pptx
updated presentation
</commit_message>
<xml_diff>
--- a/Presentation Final Edition.pptx
+++ b/Presentation Final Edition.pptx
@@ -9,8 +9,9 @@
     <p:sldId id="258" r:id="rId3"/>
     <p:sldId id="257" r:id="rId4"/>
     <p:sldId id="259" r:id="rId5"/>
-    <p:sldId id="260" r:id="rId6"/>
-    <p:sldId id="261" r:id="rId7"/>
+    <p:sldId id="262" r:id="rId6"/>
+    <p:sldId id="260" r:id="rId7"/>
+    <p:sldId id="261" r:id="rId8"/>
   </p:sldIdLst>
   <p:sldSz cx="12192000" cy="6858000"/>
   <p:notesSz cx="6858000" cy="9144000"/>
@@ -111,7 +112,7 @@
   </p:defaultTextStyle>
   <p:extLst>
     <p:ext uri="{EFAFB233-063F-42B5-8137-9DF3F51BA10A}">
-      <p15:sldGuideLst xmlns:p15="http://schemas.microsoft.com/office/powerpoint/2012/main"/>
+      <p15:sldGuideLst xmlns="" xmlns:p15="http://schemas.microsoft.com/office/powerpoint/2012/main"/>
     </p:ext>
   </p:extLst>
 </p:presentation>
@@ -336,7 +337,7 @@
           <a:p>
             <a:fld id="{275923A7-394F-45B3-B9E8-A742D4C55B21}" type="datetimeFigureOut">
               <a:rPr lang="en-US" smtClean="0"/>
-              <a:t>11/7/19</a:t>
+              <a:t>11/8/2019</a:t>
             </a:fld>
             <a:endParaRPr lang="en-US"/>
           </a:p>
@@ -591,7 +592,7 @@
           <a:p>
             <a:fld id="{275923A7-394F-45B3-B9E8-A742D4C55B21}" type="datetimeFigureOut">
               <a:rPr lang="en-US" smtClean="0"/>
-              <a:t>11/7/19</a:t>
+              <a:t>11/8/2019</a:t>
             </a:fld>
             <a:endParaRPr lang="en-US"/>
           </a:p>
@@ -759,7 +760,7 @@
           <a:p>
             <a:fld id="{275923A7-394F-45B3-B9E8-A742D4C55B21}" type="datetimeFigureOut">
               <a:rPr lang="en-US" smtClean="0"/>
-              <a:t>11/7/19</a:t>
+              <a:t>11/8/2019</a:t>
             </a:fld>
             <a:endParaRPr lang="en-US"/>
           </a:p>
@@ -937,7 +938,7 @@
           <a:p>
             <a:fld id="{275923A7-394F-45B3-B9E8-A742D4C55B21}" type="datetimeFigureOut">
               <a:rPr lang="en-US" smtClean="0"/>
-              <a:t>11/7/19</a:t>
+              <a:t>11/8/2019</a:t>
             </a:fld>
             <a:endParaRPr lang="en-US"/>
           </a:p>
@@ -990,7 +991,7 @@
           <p:cNvPr id="7" name="Picture 6" descr="E:\websites\free-power-point-templates\2012\logos.png">
             <a:extLst>
               <a:ext uri="{FF2B5EF4-FFF2-40B4-BE49-F238E27FC236}">
-                <a16:creationId xmlns:a16="http://schemas.microsoft.com/office/drawing/2014/main" id="{08B89D22-1D6E-450B-881F-4D2A4C527F72}"/>
+                <a16:creationId xmlns="" xmlns:a16="http://schemas.microsoft.com/office/drawing/2014/main" id="{08B89D22-1D6E-450B-881F-4D2A4C527F72}"/>
               </a:ext>
             </a:extLst>
           </p:cNvPr>
@@ -1219,7 +1220,7 @@
           <a:p>
             <a:fld id="{275923A7-394F-45B3-B9E8-A742D4C55B21}" type="datetimeFigureOut">
               <a:rPr lang="en-US" smtClean="0"/>
-              <a:t>11/7/19</a:t>
+              <a:t>11/8/2019</a:t>
             </a:fld>
             <a:endParaRPr lang="en-US"/>
           </a:p>
@@ -1466,7 +1467,7 @@
           <a:p>
             <a:fld id="{275923A7-394F-45B3-B9E8-A742D4C55B21}" type="datetimeFigureOut">
               <a:rPr lang="en-US" smtClean="0"/>
-              <a:t>11/7/19</a:t>
+              <a:t>11/8/2019</a:t>
             </a:fld>
             <a:endParaRPr lang="en-US"/>
           </a:p>
@@ -1711,7 +1712,7 @@
           <a:p>
             <a:fld id="{275923A7-394F-45B3-B9E8-A742D4C55B21}" type="datetimeFigureOut">
               <a:rPr lang="en-US" smtClean="0"/>
-              <a:t>11/7/19</a:t>
+              <a:t>11/8/2019</a:t>
             </a:fld>
             <a:endParaRPr lang="en-US"/>
           </a:p>
@@ -1996,7 +1997,7 @@
           <a:p>
             <a:fld id="{275923A7-394F-45B3-B9E8-A742D4C55B21}" type="datetimeFigureOut">
               <a:rPr lang="en-US" smtClean="0"/>
-              <a:t>11/7/19</a:t>
+              <a:t>11/8/2019</a:t>
             </a:fld>
             <a:endParaRPr lang="en-US"/>
           </a:p>
@@ -2484,7 +2485,7 @@
           <a:p>
             <a:fld id="{275923A7-394F-45B3-B9E8-A742D4C55B21}" type="datetimeFigureOut">
               <a:rPr lang="en-US" smtClean="0"/>
-              <a:t>11/7/19</a:t>
+              <a:t>11/8/2019</a:t>
             </a:fld>
             <a:endParaRPr lang="en-US"/>
           </a:p>
@@ -2601,7 +2602,7 @@
           <a:p>
             <a:fld id="{275923A7-394F-45B3-B9E8-A742D4C55B21}" type="datetimeFigureOut">
               <a:rPr lang="en-US" smtClean="0"/>
-              <a:t>11/7/19</a:t>
+              <a:t>11/8/2019</a:t>
             </a:fld>
             <a:endParaRPr lang="en-US"/>
           </a:p>
@@ -2696,7 +2697,7 @@
           <a:p>
             <a:fld id="{275923A7-394F-45B3-B9E8-A742D4C55B21}" type="datetimeFigureOut">
               <a:rPr lang="en-US" smtClean="0"/>
-              <a:t>11/7/19</a:t>
+              <a:t>11/8/2019</a:t>
             </a:fld>
             <a:endParaRPr lang="en-US"/>
           </a:p>
@@ -2971,7 +2972,7 @@
           <a:p>
             <a:fld id="{275923A7-394F-45B3-B9E8-A742D4C55B21}" type="datetimeFigureOut">
               <a:rPr lang="en-US" smtClean="0"/>
-              <a:t>11/7/19</a:t>
+              <a:t>11/8/2019</a:t>
             </a:fld>
             <a:endParaRPr lang="en-US"/>
           </a:p>
@@ -3191,7 +3192,7 @@
           <a:p>
             <a:fld id="{275923A7-394F-45B3-B9E8-A742D4C55B21}" type="datetimeFigureOut">
               <a:rPr lang="en-US" smtClean="0"/>
-              <a:t>11/7/19</a:t>
+              <a:t>11/8/2019</a:t>
             </a:fld>
             <a:endParaRPr lang="en-US"/>
           </a:p>
@@ -3280,7 +3281,7 @@
           <p:cNvPr id="7" name="TextBox 6">
             <a:extLst>
               <a:ext uri="{FF2B5EF4-FFF2-40B4-BE49-F238E27FC236}">
-                <a16:creationId xmlns:a16="http://schemas.microsoft.com/office/drawing/2014/main" id="{11E867DF-3DCA-4725-94F0-F2B6BD747A82}"/>
+                <a16:creationId xmlns="" xmlns:a16="http://schemas.microsoft.com/office/drawing/2014/main" id="{11E867DF-3DCA-4725-94F0-F2B6BD747A82}"/>
               </a:ext>
             </a:extLst>
           </p:cNvPr>
@@ -3625,7 +3626,7 @@
           <p:cNvPr id="2" name="Title 1">
             <a:extLst>
               <a:ext uri="{FF2B5EF4-FFF2-40B4-BE49-F238E27FC236}">
-                <a16:creationId xmlns:a16="http://schemas.microsoft.com/office/drawing/2014/main" id="{A1F9FE61-2E3B-473D-9C8B-879360FC1937}"/>
+                <a16:creationId xmlns="" xmlns:a16="http://schemas.microsoft.com/office/drawing/2014/main" id="{A1F9FE61-2E3B-473D-9C8B-879360FC1937}"/>
               </a:ext>
             </a:extLst>
           </p:cNvPr>
@@ -3658,7 +3659,7 @@
           <p:cNvPr id="3" name="Subtitle 2">
             <a:extLst>
               <a:ext uri="{FF2B5EF4-FFF2-40B4-BE49-F238E27FC236}">
-                <a16:creationId xmlns:a16="http://schemas.microsoft.com/office/drawing/2014/main" id="{CA445A47-F431-496D-8074-CD1D9F1A87C6}"/>
+                <a16:creationId xmlns="" xmlns:a16="http://schemas.microsoft.com/office/drawing/2014/main" id="{CA445A47-F431-496D-8074-CD1D9F1A87C6}"/>
               </a:ext>
             </a:extLst>
           </p:cNvPr>
@@ -3683,6 +3684,51 @@
               </a:rPr>
               <a:t>BY: </a:t>
             </a:r>
+            <a:endParaRPr lang="en-US" sz="2400" b="1" dirty="0" smtClean="0">
+              <a:latin typeface="Times New Roman" panose="02020603050405020304" pitchFamily="18" charset="0"/>
+              <a:cs typeface="Times New Roman" panose="02020603050405020304" pitchFamily="18" charset="0"/>
+            </a:endParaRPr>
+          </a:p>
+          <a:p>
+            <a:r>
+              <a:rPr lang="en-US" sz="2400" b="1" dirty="0" smtClean="0">
+                <a:latin typeface="Times New Roman" panose="02020603050405020304" pitchFamily="18" charset="0"/>
+                <a:cs typeface="Times New Roman" panose="02020603050405020304" pitchFamily="18" charset="0"/>
+              </a:rPr>
+              <a:t>Zach </a:t>
+            </a:r>
+            <a:r>
+              <a:rPr lang="en-US" sz="2400" b="1" dirty="0" err="1" smtClean="0">
+                <a:latin typeface="Times New Roman" panose="02020603050405020304" pitchFamily="18" charset="0"/>
+                <a:cs typeface="Times New Roman" panose="02020603050405020304" pitchFamily="18" charset="0"/>
+              </a:rPr>
+              <a:t>Surla</a:t>
+            </a:r>
+            <a:r>
+              <a:rPr lang="en-US" sz="2400" b="1" dirty="0" smtClean="0">
+                <a:latin typeface="Times New Roman" panose="02020603050405020304" pitchFamily="18" charset="0"/>
+                <a:cs typeface="Times New Roman" panose="02020603050405020304" pitchFamily="18" charset="0"/>
+              </a:rPr>
+              <a:t>, Chris Johnson, Thomas </a:t>
+            </a:r>
+            <a:r>
+              <a:rPr lang="en-US" sz="2400" b="1" dirty="0" err="1" smtClean="0">
+                <a:latin typeface="Times New Roman" panose="02020603050405020304" pitchFamily="18" charset="0"/>
+                <a:cs typeface="Times New Roman" panose="02020603050405020304" pitchFamily="18" charset="0"/>
+              </a:rPr>
+              <a:t>Schwartzenburg</a:t>
+            </a:r>
+            <a:r>
+              <a:rPr lang="en-US" sz="2400" b="1" dirty="0" smtClean="0">
+                <a:latin typeface="Times New Roman" panose="02020603050405020304" pitchFamily="18" charset="0"/>
+                <a:cs typeface="Times New Roman" panose="02020603050405020304" pitchFamily="18" charset="0"/>
+              </a:rPr>
+              <a:t>, Isaiah Bingham</a:t>
+            </a:r>
+            <a:endParaRPr lang="en-US" sz="2400" b="1" dirty="0">
+              <a:latin typeface="Times New Roman" panose="02020603050405020304" pitchFamily="18" charset="0"/>
+              <a:cs typeface="Times New Roman" panose="02020603050405020304" pitchFamily="18" charset="0"/>
+            </a:endParaRPr>
           </a:p>
         </p:txBody>
       </p:sp>
@@ -3721,7 +3767,7 @@
           <p:cNvPr id="2" name="Title 1">
             <a:extLst>
               <a:ext uri="{FF2B5EF4-FFF2-40B4-BE49-F238E27FC236}">
-                <a16:creationId xmlns:a16="http://schemas.microsoft.com/office/drawing/2014/main" id="{FCFA79E6-1431-4B29-9E5F-AC3F78AA2952}"/>
+                <a16:creationId xmlns="" xmlns:a16="http://schemas.microsoft.com/office/drawing/2014/main" id="{FCFA79E6-1431-4B29-9E5F-AC3F78AA2952}"/>
               </a:ext>
             </a:extLst>
           </p:cNvPr>
@@ -3749,7 +3795,7 @@
           <p:cNvPr id="3" name="Content Placeholder 2">
             <a:extLst>
               <a:ext uri="{FF2B5EF4-FFF2-40B4-BE49-F238E27FC236}">
-                <a16:creationId xmlns:a16="http://schemas.microsoft.com/office/drawing/2014/main" id="{9E1DD9F3-82BF-4D4D-AF73-ABCC88B4D98F}"/>
+                <a16:creationId xmlns="" xmlns:a16="http://schemas.microsoft.com/office/drawing/2014/main" id="{9E1DD9F3-82BF-4D4D-AF73-ABCC88B4D98F}"/>
               </a:ext>
             </a:extLst>
           </p:cNvPr>
@@ -3828,7 +3874,7 @@
           <p:cNvPr id="2" name="Title 1">
             <a:extLst>
               <a:ext uri="{FF2B5EF4-FFF2-40B4-BE49-F238E27FC236}">
-                <a16:creationId xmlns:a16="http://schemas.microsoft.com/office/drawing/2014/main" id="{111B699A-04A7-4901-A191-1D8C7FDB2464}"/>
+                <a16:creationId xmlns="" xmlns:a16="http://schemas.microsoft.com/office/drawing/2014/main" id="{111B699A-04A7-4901-A191-1D8C7FDB2464}"/>
               </a:ext>
             </a:extLst>
           </p:cNvPr>
@@ -3856,7 +3902,7 @@
           <p:cNvPr id="3" name="Content Placeholder 2">
             <a:extLst>
               <a:ext uri="{FF2B5EF4-FFF2-40B4-BE49-F238E27FC236}">
-                <a16:creationId xmlns:a16="http://schemas.microsoft.com/office/drawing/2014/main" id="{3C2EA4A2-4151-463C-AE81-F3A9F90567D6}"/>
+                <a16:creationId xmlns="" xmlns:a16="http://schemas.microsoft.com/office/drawing/2014/main" id="{3C2EA4A2-4151-463C-AE81-F3A9F90567D6}"/>
               </a:ext>
             </a:extLst>
           </p:cNvPr>
@@ -3931,7 +3977,7 @@
           <p:cNvPr id="2" name="Title 1">
             <a:extLst>
               <a:ext uri="{FF2B5EF4-FFF2-40B4-BE49-F238E27FC236}">
-                <a16:creationId xmlns:a16="http://schemas.microsoft.com/office/drawing/2014/main" id="{E61186FC-C4F0-4BFE-A0CC-80239E783EB3}"/>
+                <a16:creationId xmlns="" xmlns:a16="http://schemas.microsoft.com/office/drawing/2014/main" id="{E61186FC-C4F0-4BFE-A0CC-80239E783EB3}"/>
               </a:ext>
             </a:extLst>
           </p:cNvPr>
@@ -3959,7 +4005,7 @@
           <p:cNvPr id="3" name="Content Placeholder 2">
             <a:extLst>
               <a:ext uri="{FF2B5EF4-FFF2-40B4-BE49-F238E27FC236}">
-                <a16:creationId xmlns:a16="http://schemas.microsoft.com/office/drawing/2014/main" id="{5C4EB008-3555-4B6D-96A7-6B4C5269F92E}"/>
+                <a16:creationId xmlns="" xmlns:a16="http://schemas.microsoft.com/office/drawing/2014/main" id="{5C4EB008-3555-4B6D-96A7-6B4C5269F92E}"/>
               </a:ext>
             </a:extLst>
           </p:cNvPr>
@@ -4014,13 +4060,7 @@
       </p:grpSpPr>
       <p:sp>
         <p:nvSpPr>
-          <p:cNvPr id="2" name="Title 1">
-            <a:extLst>
-              <a:ext uri="{FF2B5EF4-FFF2-40B4-BE49-F238E27FC236}">
-                <a16:creationId xmlns:a16="http://schemas.microsoft.com/office/drawing/2014/main" id="{A857EFEB-3DBF-469B-8B67-17E2FE97C300}"/>
-              </a:ext>
-            </a:extLst>
-          </p:cNvPr>
+          <p:cNvPr id="2" name="Title 1"/>
           <p:cNvSpPr>
             <a:spLocks noGrp="1"/>
           </p:cNvSpPr>
@@ -4028,59 +4068,31 @@
             <p:ph type="title"/>
           </p:nvPr>
         </p:nvSpPr>
-        <p:spPr/>
-        <p:txBody>
-          <a:bodyPr/>
-          <a:lstStyle/>
-          <a:p>
-            <a:r>
-              <a:rPr lang="en-US" dirty="0"/>
-              <a:t>Future</a:t>
-            </a:r>
-          </a:p>
-        </p:txBody>
-      </p:sp>
-      <p:sp>
-        <p:nvSpPr>
-          <p:cNvPr id="3" name="Content Placeholder 2">
-            <a:extLst>
-              <a:ext uri="{FF2B5EF4-FFF2-40B4-BE49-F238E27FC236}">
-                <a16:creationId xmlns:a16="http://schemas.microsoft.com/office/drawing/2014/main" id="{24D4D5FD-0AA4-43D2-BF92-E5C5054E36DE}"/>
-              </a:ext>
-            </a:extLst>
-          </p:cNvPr>
-          <p:cNvSpPr>
-            <a:spLocks noGrp="1"/>
-          </p:cNvSpPr>
-          <p:nvPr>
-            <p:ph idx="1"/>
-          </p:nvPr>
-        </p:nvSpPr>
-        <p:spPr/>
-        <p:txBody>
-          <a:bodyPr/>
-          <a:lstStyle/>
-          <a:p>
-            <a:r>
-              <a:rPr lang="en-US" dirty="0"/>
-              <a:t>Implementing more user interactivity </a:t>
-            </a:r>
-          </a:p>
-          <a:p>
-            <a:r>
-              <a:rPr lang="en-US" dirty="0"/>
-              <a:t>Points and scores on song playback along with a leaderboard</a:t>
-            </a:r>
-          </a:p>
-          <a:p>
-            <a:endParaRPr lang="en-US" dirty="0"/>
+        <p:spPr>
+          <a:xfrm>
+            <a:off x="689918" y="3183984"/>
+            <a:ext cx="11012131" cy="1018035"/>
+          </a:xfrm>
+        </p:spPr>
+        <p:txBody>
+          <a:bodyPr>
+            <a:noAutofit/>
+          </a:bodyPr>
+          <a:lstStyle/>
+          <a:p>
+            <a:pPr algn="ctr"/>
+            <a:r>
+              <a:rPr lang="en-US" sz="6600" dirty="0" smtClean="0"/>
+              <a:t>Demonstration</a:t>
+            </a:r>
+            <a:endParaRPr lang="en-US" sz="6600" dirty="0"/>
           </a:p>
         </p:txBody>
       </p:sp>
     </p:spTree>
     <p:extLst>
       <p:ext uri="{BB962C8B-B14F-4D97-AF65-F5344CB8AC3E}">
-        <p14:creationId xmlns:p14="http://schemas.microsoft.com/office/powerpoint/2010/main" val="3728476056"/>
+        <p14:creationId xmlns:p14="http://schemas.microsoft.com/office/powerpoint/2010/main" val="364556952"/>
       </p:ext>
     </p:extLst>
   </p:cSld>
@@ -4112,7 +4124,7 @@
           <p:cNvPr id="2" name="Title 1">
             <a:extLst>
               <a:ext uri="{FF2B5EF4-FFF2-40B4-BE49-F238E27FC236}">
-                <a16:creationId xmlns:a16="http://schemas.microsoft.com/office/drawing/2014/main" id="{370AF120-A90E-4F89-971C-BF4CCD699985}"/>
+                <a16:creationId xmlns="" xmlns:a16="http://schemas.microsoft.com/office/drawing/2014/main" id="{A857EFEB-3DBF-469B-8B67-17E2FE97C300}"/>
               </a:ext>
             </a:extLst>
           </p:cNvPr>
@@ -4130,7 +4142,7 @@
           <a:p>
             <a:r>
               <a:rPr lang="en-US" dirty="0"/>
-              <a:t>Lessons learned</a:t>
+              <a:t>Future</a:t>
             </a:r>
           </a:p>
         </p:txBody>
@@ -4140,7 +4152,102 @@
           <p:cNvPr id="3" name="Content Placeholder 2">
             <a:extLst>
               <a:ext uri="{FF2B5EF4-FFF2-40B4-BE49-F238E27FC236}">
-                <a16:creationId xmlns:a16="http://schemas.microsoft.com/office/drawing/2014/main" id="{4A555A45-1D73-4FAA-AF08-6285416A10B5}"/>
+                <a16:creationId xmlns="" xmlns:a16="http://schemas.microsoft.com/office/drawing/2014/main" id="{24D4D5FD-0AA4-43D2-BF92-E5C5054E36DE}"/>
+              </a:ext>
+            </a:extLst>
+          </p:cNvPr>
+          <p:cNvSpPr>
+            <a:spLocks noGrp="1"/>
+          </p:cNvSpPr>
+          <p:nvPr>
+            <p:ph idx="1"/>
+          </p:nvPr>
+        </p:nvSpPr>
+        <p:spPr/>
+        <p:txBody>
+          <a:bodyPr/>
+          <a:lstStyle/>
+          <a:p>
+            <a:r>
+              <a:rPr lang="en-US" dirty="0"/>
+              <a:t>Implementing more user interactivity </a:t>
+            </a:r>
+          </a:p>
+          <a:p>
+            <a:r>
+              <a:rPr lang="en-US" dirty="0"/>
+              <a:t>Points and scores on song playback along with a leaderboard</a:t>
+            </a:r>
+          </a:p>
+          <a:p>
+            <a:endParaRPr lang="en-US" dirty="0"/>
+          </a:p>
+        </p:txBody>
+      </p:sp>
+    </p:spTree>
+    <p:extLst>
+      <p:ext uri="{BB962C8B-B14F-4D97-AF65-F5344CB8AC3E}">
+        <p14:creationId xmlns:p14="http://schemas.microsoft.com/office/powerpoint/2010/main" val="3728476056"/>
+      </p:ext>
+    </p:extLst>
+  </p:cSld>
+  <p:clrMapOvr>
+    <a:masterClrMapping/>
+  </p:clrMapOvr>
+</p:sld>
+</file>
+
+<file path=ppt/slides/slide7.xml><?xml version="1.0" encoding="utf-8"?>
+<p:sld xmlns:a="http://schemas.openxmlformats.org/drawingml/2006/main" xmlns:r="http://schemas.openxmlformats.org/officeDocument/2006/relationships" xmlns:p="http://schemas.openxmlformats.org/presentationml/2006/main">
+  <p:cSld>
+    <p:spTree>
+      <p:nvGrpSpPr>
+        <p:cNvPr id="1" name=""/>
+        <p:cNvGrpSpPr/>
+        <p:nvPr/>
+      </p:nvGrpSpPr>
+      <p:grpSpPr>
+        <a:xfrm>
+          <a:off x="0" y="0"/>
+          <a:ext cx="0" cy="0"/>
+          <a:chOff x="0" y="0"/>
+          <a:chExt cx="0" cy="0"/>
+        </a:xfrm>
+      </p:grpSpPr>
+      <p:sp>
+        <p:nvSpPr>
+          <p:cNvPr id="2" name="Title 1">
+            <a:extLst>
+              <a:ext uri="{FF2B5EF4-FFF2-40B4-BE49-F238E27FC236}">
+                <a16:creationId xmlns="" xmlns:a16="http://schemas.microsoft.com/office/drawing/2014/main" id="{370AF120-A90E-4F89-971C-BF4CCD699985}"/>
+              </a:ext>
+            </a:extLst>
+          </p:cNvPr>
+          <p:cNvSpPr>
+            <a:spLocks noGrp="1"/>
+          </p:cNvSpPr>
+          <p:nvPr>
+            <p:ph type="title"/>
+          </p:nvPr>
+        </p:nvSpPr>
+        <p:spPr/>
+        <p:txBody>
+          <a:bodyPr/>
+          <a:lstStyle/>
+          <a:p>
+            <a:r>
+              <a:rPr lang="en-US" dirty="0"/>
+              <a:t>Lessons learned</a:t>
+            </a:r>
+          </a:p>
+        </p:txBody>
+      </p:sp>
+      <p:sp>
+        <p:nvSpPr>
+          <p:cNvPr id="3" name="Content Placeholder 2">
+            <a:extLst>
+              <a:ext uri="{FF2B5EF4-FFF2-40B4-BE49-F238E27FC236}">
+                <a16:creationId xmlns="" xmlns:a16="http://schemas.microsoft.com/office/drawing/2014/main" id="{4A555A45-1D73-4FAA-AF08-6285416A10B5}"/>
               </a:ext>
             </a:extLst>
           </p:cNvPr>

</xml_diff>